<commit_message>
Improve assets and app icon.
</commit_message>
<xml_diff>
--- a/.assets/summary.pptx
+++ b/.assets/summary.pptx
@@ -244,7 +244,7 @@
           <a:p>
             <a:fld id="{59A06FC0-009A-43F9-BAD4-D46CEE07C2B0}" type="datetimeFigureOut">
               <a:rPr kumimoji="1" lang="ja-JP" altLang="en-US" smtClean="0"/>
-              <a:t>2020/5/10</a:t>
+              <a:t>2020/5/12</a:t>
             </a:fld>
             <a:endParaRPr kumimoji="1" lang="ja-JP" altLang="en-US"/>
           </a:p>
@@ -414,7 +414,7 @@
           <a:p>
             <a:fld id="{59A06FC0-009A-43F9-BAD4-D46CEE07C2B0}" type="datetimeFigureOut">
               <a:rPr kumimoji="1" lang="ja-JP" altLang="en-US" smtClean="0"/>
-              <a:t>2020/5/10</a:t>
+              <a:t>2020/5/12</a:t>
             </a:fld>
             <a:endParaRPr kumimoji="1" lang="ja-JP" altLang="en-US"/>
           </a:p>
@@ -594,7 +594,7 @@
           <a:p>
             <a:fld id="{59A06FC0-009A-43F9-BAD4-D46CEE07C2B0}" type="datetimeFigureOut">
               <a:rPr kumimoji="1" lang="ja-JP" altLang="en-US" smtClean="0"/>
-              <a:t>2020/5/10</a:t>
+              <a:t>2020/5/12</a:t>
             </a:fld>
             <a:endParaRPr kumimoji="1" lang="ja-JP" altLang="en-US"/>
           </a:p>
@@ -764,7 +764,7 @@
           <a:p>
             <a:fld id="{59A06FC0-009A-43F9-BAD4-D46CEE07C2B0}" type="datetimeFigureOut">
               <a:rPr kumimoji="1" lang="ja-JP" altLang="en-US" smtClean="0"/>
-              <a:t>2020/5/10</a:t>
+              <a:t>2020/5/12</a:t>
             </a:fld>
             <a:endParaRPr kumimoji="1" lang="ja-JP" altLang="en-US"/>
           </a:p>
@@ -1008,7 +1008,7 @@
           <a:p>
             <a:fld id="{59A06FC0-009A-43F9-BAD4-D46CEE07C2B0}" type="datetimeFigureOut">
               <a:rPr kumimoji="1" lang="ja-JP" altLang="en-US" smtClean="0"/>
-              <a:t>2020/5/10</a:t>
+              <a:t>2020/5/12</a:t>
             </a:fld>
             <a:endParaRPr kumimoji="1" lang="ja-JP" altLang="en-US"/>
           </a:p>
@@ -1240,7 +1240,7 @@
           <a:p>
             <a:fld id="{59A06FC0-009A-43F9-BAD4-D46CEE07C2B0}" type="datetimeFigureOut">
               <a:rPr kumimoji="1" lang="ja-JP" altLang="en-US" smtClean="0"/>
-              <a:t>2020/5/10</a:t>
+              <a:t>2020/5/12</a:t>
             </a:fld>
             <a:endParaRPr kumimoji="1" lang="ja-JP" altLang="en-US"/>
           </a:p>
@@ -1607,7 +1607,7 @@
           <a:p>
             <a:fld id="{59A06FC0-009A-43F9-BAD4-D46CEE07C2B0}" type="datetimeFigureOut">
               <a:rPr kumimoji="1" lang="ja-JP" altLang="en-US" smtClean="0"/>
-              <a:t>2020/5/10</a:t>
+              <a:t>2020/5/12</a:t>
             </a:fld>
             <a:endParaRPr kumimoji="1" lang="ja-JP" altLang="en-US"/>
           </a:p>
@@ -1725,7 +1725,7 @@
           <a:p>
             <a:fld id="{59A06FC0-009A-43F9-BAD4-D46CEE07C2B0}" type="datetimeFigureOut">
               <a:rPr kumimoji="1" lang="ja-JP" altLang="en-US" smtClean="0"/>
-              <a:t>2020/5/10</a:t>
+              <a:t>2020/5/12</a:t>
             </a:fld>
             <a:endParaRPr kumimoji="1" lang="ja-JP" altLang="en-US"/>
           </a:p>
@@ -1820,7 +1820,7 @@
           <a:p>
             <a:fld id="{59A06FC0-009A-43F9-BAD4-D46CEE07C2B0}" type="datetimeFigureOut">
               <a:rPr kumimoji="1" lang="ja-JP" altLang="en-US" smtClean="0"/>
-              <a:t>2020/5/10</a:t>
+              <a:t>2020/5/12</a:t>
             </a:fld>
             <a:endParaRPr kumimoji="1" lang="ja-JP" altLang="en-US"/>
           </a:p>
@@ -2097,7 +2097,7 @@
           <a:p>
             <a:fld id="{59A06FC0-009A-43F9-BAD4-D46CEE07C2B0}" type="datetimeFigureOut">
               <a:rPr kumimoji="1" lang="ja-JP" altLang="en-US" smtClean="0"/>
-              <a:t>2020/5/10</a:t>
+              <a:t>2020/5/12</a:t>
             </a:fld>
             <a:endParaRPr kumimoji="1" lang="ja-JP" altLang="en-US"/>
           </a:p>
@@ -2354,7 +2354,7 @@
           <a:p>
             <a:fld id="{59A06FC0-009A-43F9-BAD4-D46CEE07C2B0}" type="datetimeFigureOut">
               <a:rPr kumimoji="1" lang="ja-JP" altLang="en-US" smtClean="0"/>
-              <a:t>2020/5/10</a:t>
+              <a:t>2020/5/12</a:t>
             </a:fld>
             <a:endParaRPr kumimoji="1" lang="ja-JP" altLang="en-US"/>
           </a:p>
@@ -2567,7 +2567,7 @@
           <a:p>
             <a:fld id="{59A06FC0-009A-43F9-BAD4-D46CEE07C2B0}" type="datetimeFigureOut">
               <a:rPr kumimoji="1" lang="ja-JP" altLang="en-US" smtClean="0"/>
-              <a:t>2020/5/10</a:t>
+              <a:t>2020/5/12</a:t>
             </a:fld>
             <a:endParaRPr kumimoji="1" lang="ja-JP" altLang="en-US"/>
           </a:p>
@@ -2972,30 +2972,275 @@
           <a:chExt cx="0" cy="0"/>
         </a:xfrm>
       </p:grpSpPr>
-      <p:pic>
-        <p:nvPicPr>
-          <p:cNvPr id="4" name="Picture 3"/>
-          <p:cNvPicPr>
-            <a:picLocks noChangeAspect="1"/>
-          </p:cNvPicPr>
+      <p:sp>
+        <p:nvSpPr>
+          <p:cNvPr id="53" name="Rectangle 52">
+            <a:extLst>
+              <a:ext uri="{FF2B5EF4-FFF2-40B4-BE49-F238E27FC236}">
+                <a16:creationId xmlns:a16="http://schemas.microsoft.com/office/drawing/2014/main" id="{2975FE74-65C1-4C38-9469-454E967E7664}"/>
+              </a:ext>
+            </a:extLst>
+          </p:cNvPr>
+          <p:cNvSpPr/>
           <p:nvPr/>
-        </p:nvPicPr>
-        <p:blipFill>
-          <a:blip r:embed="rId2"/>
-          <a:stretch>
-            <a:fillRect/>
-          </a:stretch>
-        </p:blipFill>
+        </p:nvSpPr>
         <p:spPr>
-          <a:xfrm flipH="1">
-            <a:off x="6527387" y="2933361"/>
-            <a:ext cx="1119147" cy="1119147"/>
+          <a:xfrm>
+            <a:off x="1" y="2152918"/>
+            <a:ext cx="9144000" cy="3048474"/>
           </a:xfrm>
           <a:prstGeom prst="rect">
             <a:avLst/>
           </a:prstGeom>
+          <a:solidFill>
+            <a:srgbClr val="D24726"/>
+          </a:solidFill>
+          <a:ln>
+            <a:noFill/>
+          </a:ln>
+          <a:effectLst/>
         </p:spPr>
-      </p:pic>
+        <p:style>
+          <a:lnRef idx="2">
+            <a:schemeClr val="accent1">
+              <a:shade val="50000"/>
+            </a:schemeClr>
+          </a:lnRef>
+          <a:fillRef idx="1">
+            <a:schemeClr val="accent1"/>
+          </a:fillRef>
+          <a:effectRef idx="0">
+            <a:schemeClr val="accent1"/>
+          </a:effectRef>
+          <a:fontRef idx="minor">
+            <a:schemeClr val="lt1"/>
+          </a:fontRef>
+        </p:style>
+        <p:txBody>
+          <a:bodyPr rtlCol="0" anchor="ctr"/>
+          <a:lstStyle/>
+          <a:p>
+            <a:pPr algn="ctr"/>
+            <a:endParaRPr lang="en-US"/>
+          </a:p>
+        </p:txBody>
+      </p:sp>
+      <p:sp>
+        <p:nvSpPr>
+          <p:cNvPr id="64" name="Rectangle: Rounded Corners 63">
+            <a:extLst>
+              <a:ext uri="{FF2B5EF4-FFF2-40B4-BE49-F238E27FC236}">
+                <a16:creationId xmlns:a16="http://schemas.microsoft.com/office/drawing/2014/main" id="{9211EE39-DF1B-4AAE-9FE2-4E02BF87886B}"/>
+              </a:ext>
+            </a:extLst>
+          </p:cNvPr>
+          <p:cNvSpPr/>
+          <p:nvPr/>
+        </p:nvSpPr>
+        <p:spPr>
+          <a:xfrm>
+            <a:off x="2947772" y="3172114"/>
+            <a:ext cx="821747" cy="513771"/>
+          </a:xfrm>
+          <a:prstGeom prst="roundRect">
+            <a:avLst>
+              <a:gd name="adj" fmla="val 8324"/>
+            </a:avLst>
+          </a:prstGeom>
+          <a:solidFill>
+            <a:schemeClr val="bg1"/>
+          </a:solidFill>
+          <a:ln>
+            <a:noFill/>
+          </a:ln>
+        </p:spPr>
+        <p:style>
+          <a:lnRef idx="2">
+            <a:schemeClr val="accent1">
+              <a:shade val="50000"/>
+            </a:schemeClr>
+          </a:lnRef>
+          <a:fillRef idx="1">
+            <a:schemeClr val="accent1"/>
+          </a:fillRef>
+          <a:effectRef idx="0">
+            <a:schemeClr val="accent1"/>
+          </a:effectRef>
+          <a:fontRef idx="minor">
+            <a:schemeClr val="lt1"/>
+          </a:fontRef>
+        </p:style>
+        <p:txBody>
+          <a:bodyPr rtlCol="0" anchor="ctr"/>
+          <a:lstStyle/>
+          <a:p>
+            <a:pPr algn="ctr"/>
+            <a:endParaRPr lang="en-US"/>
+          </a:p>
+        </p:txBody>
+      </p:sp>
+      <p:sp>
+        <p:nvSpPr>
+          <p:cNvPr id="69" name="Rectangle: Rounded Corners 68">
+            <a:extLst>
+              <a:ext uri="{FF2B5EF4-FFF2-40B4-BE49-F238E27FC236}">
+                <a16:creationId xmlns:a16="http://schemas.microsoft.com/office/drawing/2014/main" id="{61CE5315-87D8-413D-8FDF-030132B2FDBB}"/>
+              </a:ext>
+            </a:extLst>
+          </p:cNvPr>
+          <p:cNvSpPr/>
+          <p:nvPr/>
+        </p:nvSpPr>
+        <p:spPr>
+          <a:xfrm>
+            <a:off x="3098827" y="3774285"/>
+            <a:ext cx="494479" cy="73004"/>
+          </a:xfrm>
+          <a:prstGeom prst="roundRect">
+            <a:avLst>
+              <a:gd name="adj" fmla="val 8324"/>
+            </a:avLst>
+          </a:prstGeom>
+          <a:solidFill>
+            <a:schemeClr val="bg1"/>
+          </a:solidFill>
+          <a:ln>
+            <a:noFill/>
+          </a:ln>
+        </p:spPr>
+        <p:style>
+          <a:lnRef idx="2">
+            <a:schemeClr val="accent1">
+              <a:shade val="50000"/>
+            </a:schemeClr>
+          </a:lnRef>
+          <a:fillRef idx="1">
+            <a:schemeClr val="accent1"/>
+          </a:fillRef>
+          <a:effectRef idx="0">
+            <a:schemeClr val="accent1"/>
+          </a:effectRef>
+          <a:fontRef idx="minor">
+            <a:schemeClr val="lt1"/>
+          </a:fontRef>
+        </p:style>
+        <p:txBody>
+          <a:bodyPr rtlCol="0" anchor="ctr"/>
+          <a:lstStyle/>
+          <a:p>
+            <a:pPr algn="ctr"/>
+            <a:endParaRPr lang="en-US"/>
+          </a:p>
+        </p:txBody>
+      </p:sp>
+      <p:sp>
+        <p:nvSpPr>
+          <p:cNvPr id="59" name="Rectangle: Rounded Corners 58">
+            <a:extLst>
+              <a:ext uri="{FF2B5EF4-FFF2-40B4-BE49-F238E27FC236}">
+                <a16:creationId xmlns:a16="http://schemas.microsoft.com/office/drawing/2014/main" id="{8281DB78-4E1C-4534-960C-511945194D18}"/>
+              </a:ext>
+            </a:extLst>
+          </p:cNvPr>
+          <p:cNvSpPr/>
+          <p:nvPr/>
+        </p:nvSpPr>
+        <p:spPr>
+          <a:xfrm>
+            <a:off x="6670345" y="3167063"/>
+            <a:ext cx="825830" cy="498277"/>
+          </a:xfrm>
+          <a:prstGeom prst="roundRect">
+            <a:avLst>
+              <a:gd name="adj" fmla="val 8324"/>
+            </a:avLst>
+          </a:prstGeom>
+          <a:solidFill>
+            <a:schemeClr val="bg1"/>
+          </a:solidFill>
+          <a:ln>
+            <a:noFill/>
+          </a:ln>
+        </p:spPr>
+        <p:style>
+          <a:lnRef idx="2">
+            <a:schemeClr val="accent1">
+              <a:shade val="50000"/>
+            </a:schemeClr>
+          </a:lnRef>
+          <a:fillRef idx="1">
+            <a:schemeClr val="accent1"/>
+          </a:fillRef>
+          <a:effectRef idx="0">
+            <a:schemeClr val="accent1"/>
+          </a:effectRef>
+          <a:fontRef idx="minor">
+            <a:schemeClr val="lt1"/>
+          </a:fontRef>
+        </p:style>
+        <p:txBody>
+          <a:bodyPr rtlCol="0" anchor="ctr"/>
+          <a:lstStyle/>
+          <a:p>
+            <a:pPr algn="ctr"/>
+            <a:endParaRPr lang="en-US"/>
+          </a:p>
+        </p:txBody>
+      </p:sp>
+      <p:sp>
+        <p:nvSpPr>
+          <p:cNvPr id="3" name="Rectangle: Rounded Corners 2">
+            <a:extLst>
+              <a:ext uri="{FF2B5EF4-FFF2-40B4-BE49-F238E27FC236}">
+                <a16:creationId xmlns:a16="http://schemas.microsoft.com/office/drawing/2014/main" id="{48DFA51E-46CD-4D3F-966B-14221DE9F83A}"/>
+              </a:ext>
+            </a:extLst>
+          </p:cNvPr>
+          <p:cNvSpPr/>
+          <p:nvPr/>
+        </p:nvSpPr>
+        <p:spPr>
+          <a:xfrm>
+            <a:off x="5465797" y="3093244"/>
+            <a:ext cx="732941" cy="513771"/>
+          </a:xfrm>
+          <a:prstGeom prst="roundRect">
+            <a:avLst>
+              <a:gd name="adj" fmla="val 8324"/>
+            </a:avLst>
+          </a:prstGeom>
+          <a:solidFill>
+            <a:schemeClr val="bg1"/>
+          </a:solidFill>
+          <a:ln>
+            <a:noFill/>
+          </a:ln>
+        </p:spPr>
+        <p:style>
+          <a:lnRef idx="2">
+            <a:schemeClr val="accent1">
+              <a:shade val="50000"/>
+            </a:schemeClr>
+          </a:lnRef>
+          <a:fillRef idx="1">
+            <a:schemeClr val="accent1"/>
+          </a:fillRef>
+          <a:effectRef idx="0">
+            <a:schemeClr val="accent1"/>
+          </a:effectRef>
+          <a:fontRef idx="minor">
+            <a:schemeClr val="lt1"/>
+          </a:fontRef>
+        </p:style>
+        <p:txBody>
+          <a:bodyPr rtlCol="0" anchor="ctr"/>
+          <a:lstStyle/>
+          <a:p>
+            <a:pPr algn="ctr"/>
+            <a:endParaRPr lang="en-US"/>
+          </a:p>
+        </p:txBody>
+      </p:sp>
       <p:grpSp>
         <p:nvGrpSpPr>
           <p:cNvPr id="31" name="Group 30"/>
@@ -4317,7 +4562,7 @@
         </p:nvSpPr>
         <p:spPr>
           <a:xfrm>
-            <a:off x="5728186" y="2452032"/>
+            <a:off x="5718373" y="2452032"/>
             <a:ext cx="1508490" cy="276999"/>
           </a:xfrm>
           <a:prstGeom prst="rect">
@@ -4332,14 +4577,47 @@
           <a:lstStyle/>
           <a:p>
             <a:r>
-              <a:rPr kumimoji="1" lang="en-US" altLang="ja-JP" sz="1200" dirty="0"/>
+              <a:rPr kumimoji="1" lang="en-US" altLang="ja-JP" sz="1200" dirty="0">
+                <a:solidFill>
+                  <a:schemeClr val="bg1"/>
+                </a:solidFill>
+                <a:effectLst>
+                  <a:outerShdw blurRad="38100" dist="38100" dir="2700000" algn="tl">
+                    <a:srgbClr val="000000">
+                      <a:alpha val="43137"/>
+                    </a:srgbClr>
+                  </a:outerShdw>
+                </a:effectLst>
+              </a:rPr>
               <a:t>Projection: </a:t>
             </a:r>
             <a:r>
-              <a:rPr kumimoji="1" lang="en-US" altLang="ja-JP" sz="1200" b="1" dirty="0"/>
+              <a:rPr kumimoji="1" lang="en-US" altLang="ja-JP" sz="1200" b="1" dirty="0">
+                <a:solidFill>
+                  <a:schemeClr val="bg1"/>
+                </a:solidFill>
+                <a:effectLst>
+                  <a:outerShdw blurRad="38100" dist="38100" dir="2700000" algn="tl">
+                    <a:srgbClr val="000000">
+                      <a:alpha val="43137"/>
+                    </a:srgbClr>
+                  </a:outerShdw>
+                </a:effectLst>
+              </a:rPr>
               <a:t>Duplicate</a:t>
             </a:r>
-            <a:endParaRPr kumimoji="1" lang="ja-JP" altLang="en-US" sz="1200" b="1" dirty="0"/>
+            <a:endParaRPr kumimoji="1" lang="ja-JP" altLang="en-US" sz="1200" b="1" dirty="0">
+              <a:solidFill>
+                <a:schemeClr val="bg1"/>
+              </a:solidFill>
+              <a:effectLst>
+                <a:outerShdw blurRad="38100" dist="38100" dir="2700000" algn="tl">
+                  <a:srgbClr val="000000">
+                    <a:alpha val="43137"/>
+                  </a:srgbClr>
+                </a:outerShdw>
+              </a:effectLst>
+            </a:endParaRPr>
           </a:p>
         </p:txBody>
       </p:sp>
@@ -4351,7 +4629,7 @@
         </p:nvSpPr>
         <p:spPr>
           <a:xfrm>
-            <a:off x="2178915" y="2452032"/>
+            <a:off x="2003939" y="2452032"/>
             <a:ext cx="1342483" cy="276999"/>
           </a:xfrm>
           <a:prstGeom prst="rect">
@@ -4366,14 +4644,47 @@
           <a:lstStyle/>
           <a:p>
             <a:r>
-              <a:rPr kumimoji="1" lang="en-US" altLang="ja-JP" sz="1200" dirty="0"/>
+              <a:rPr kumimoji="1" lang="en-US" altLang="ja-JP" sz="1200" dirty="0">
+                <a:solidFill>
+                  <a:schemeClr val="bg1"/>
+                </a:solidFill>
+                <a:effectLst>
+                  <a:outerShdw blurRad="38100" dist="38100" dir="2700000" algn="tl">
+                    <a:srgbClr val="000000">
+                      <a:alpha val="43137"/>
+                    </a:srgbClr>
+                  </a:outerShdw>
+                </a:effectLst>
+              </a:rPr>
               <a:t>Projection: </a:t>
             </a:r>
             <a:r>
-              <a:rPr kumimoji="1" lang="en-US" altLang="ja-JP" sz="1200" b="1" dirty="0"/>
+              <a:rPr kumimoji="1" lang="en-US" altLang="ja-JP" sz="1200" b="1" dirty="0">
+                <a:solidFill>
+                  <a:schemeClr val="bg1"/>
+                </a:solidFill>
+                <a:effectLst>
+                  <a:outerShdw blurRad="38100" dist="38100" dir="2700000" algn="tl">
+                    <a:srgbClr val="000000">
+                      <a:alpha val="43137"/>
+                    </a:srgbClr>
+                  </a:outerShdw>
+                </a:effectLst>
+              </a:rPr>
               <a:t>Extend</a:t>
             </a:r>
-            <a:endParaRPr kumimoji="1" lang="ja-JP" altLang="en-US" sz="1200" b="1" dirty="0"/>
+            <a:endParaRPr kumimoji="1" lang="ja-JP" altLang="en-US" sz="1200" b="1" dirty="0">
+              <a:solidFill>
+                <a:schemeClr val="bg1"/>
+              </a:solidFill>
+              <a:effectLst>
+                <a:outerShdw blurRad="38100" dist="38100" dir="2700000" algn="tl">
+                  <a:srgbClr val="000000">
+                    <a:alpha val="43137"/>
+                  </a:srgbClr>
+                </a:outerShdw>
+              </a:effectLst>
+            </a:endParaRPr>
           </a:p>
         </p:txBody>
       </p:sp>
@@ -4385,7 +4696,7 @@
         </p:nvSpPr>
         <p:spPr>
           <a:xfrm>
-            <a:off x="1704699" y="2758557"/>
+            <a:off x="1704699" y="2751036"/>
             <a:ext cx="850939" cy="276999"/>
           </a:xfrm>
           <a:prstGeom prst="rect">
@@ -4400,10 +4711,32 @@
           <a:lstStyle/>
           <a:p>
             <a:r>
-              <a:rPr kumimoji="1" lang="en-US" altLang="ja-JP" sz="1200" dirty="0"/>
+              <a:rPr kumimoji="1" lang="en-US" altLang="ja-JP" sz="1200" dirty="0">
+                <a:solidFill>
+                  <a:schemeClr val="bg1"/>
+                </a:solidFill>
+                <a:effectLst>
+                  <a:outerShdw blurRad="38100" dist="38100" dir="2700000" algn="tl">
+                    <a:srgbClr val="000000">
+                      <a:alpha val="43137"/>
+                    </a:srgbClr>
+                  </a:outerShdw>
+                </a:effectLst>
+              </a:rPr>
               <a:t>Slide show</a:t>
             </a:r>
-            <a:endParaRPr kumimoji="1" lang="ja-JP" altLang="en-US" sz="1200" dirty="0"/>
+            <a:endParaRPr kumimoji="1" lang="ja-JP" altLang="en-US" sz="1200" dirty="0">
+              <a:solidFill>
+                <a:schemeClr val="bg1"/>
+              </a:solidFill>
+              <a:effectLst>
+                <a:outerShdw blurRad="38100" dist="38100" dir="2700000" algn="tl">
+                  <a:srgbClr val="000000">
+                    <a:alpha val="43137"/>
+                  </a:srgbClr>
+                </a:outerShdw>
+              </a:effectLst>
+            </a:endParaRPr>
           </a:p>
         </p:txBody>
       </p:sp>
@@ -4415,7 +4748,7 @@
         </p:nvSpPr>
         <p:spPr>
           <a:xfrm>
-            <a:off x="2794724" y="2758557"/>
+            <a:off x="2794724" y="2751036"/>
             <a:ext cx="1132554" cy="276999"/>
           </a:xfrm>
           <a:prstGeom prst="rect">
@@ -4430,10 +4763,32 @@
           <a:lstStyle/>
           <a:p>
             <a:r>
-              <a:rPr kumimoji="1" lang="en-US" altLang="ja-JP" sz="1200" dirty="0"/>
+              <a:rPr kumimoji="1" lang="en-US" altLang="ja-JP" sz="1200" dirty="0">
+                <a:solidFill>
+                  <a:schemeClr val="bg1"/>
+                </a:solidFill>
+                <a:effectLst>
+                  <a:outerShdw blurRad="38100" dist="38100" dir="2700000" algn="tl">
+                    <a:srgbClr val="000000">
+                      <a:alpha val="43137"/>
+                    </a:srgbClr>
+                  </a:outerShdw>
+                </a:effectLst>
+              </a:rPr>
               <a:t>Presenter View</a:t>
             </a:r>
-            <a:endParaRPr kumimoji="1" lang="ja-JP" altLang="en-US" sz="1200" dirty="0"/>
+            <a:endParaRPr kumimoji="1" lang="ja-JP" altLang="en-US" sz="1200" dirty="0">
+              <a:solidFill>
+                <a:schemeClr val="bg1"/>
+              </a:solidFill>
+              <a:effectLst>
+                <a:outerShdw blurRad="38100" dist="38100" dir="2700000" algn="tl">
+                  <a:srgbClr val="000000">
+                    <a:alpha val="43137"/>
+                  </a:srgbClr>
+                </a:outerShdw>
+              </a:effectLst>
+            </a:endParaRPr>
           </a:p>
         </p:txBody>
       </p:sp>
@@ -4445,7 +4800,7 @@
         </p:nvSpPr>
         <p:spPr>
           <a:xfrm>
-            <a:off x="5708561" y="2758557"/>
+            <a:off x="5857642" y="2751036"/>
             <a:ext cx="1229952" cy="276999"/>
           </a:xfrm>
           <a:prstGeom prst="rect">
@@ -4460,10 +4815,32 @@
           <a:lstStyle/>
           <a:p>
             <a:r>
-              <a:rPr kumimoji="1" lang="en-US" altLang="ja-JP" sz="1200" dirty="0"/>
+              <a:rPr kumimoji="1" lang="en-US" altLang="ja-JP" sz="1200" dirty="0">
+                <a:solidFill>
+                  <a:schemeClr val="bg1"/>
+                </a:solidFill>
+                <a:effectLst>
+                  <a:outerShdw blurRad="38100" dist="38100" dir="2700000" algn="tl">
+                    <a:srgbClr val="000000">
+                      <a:alpha val="43137"/>
+                    </a:srgbClr>
+                  </a:outerShdw>
+                </a:effectLst>
+              </a:rPr>
               <a:t>Hide PowerPoint</a:t>
             </a:r>
-            <a:endParaRPr kumimoji="1" lang="ja-JP" altLang="en-US" sz="1200" dirty="0"/>
+            <a:endParaRPr kumimoji="1" lang="ja-JP" altLang="en-US" sz="1200" dirty="0">
+              <a:solidFill>
+                <a:schemeClr val="bg1"/>
+              </a:solidFill>
+              <a:effectLst>
+                <a:outerShdw blurRad="38100" dist="38100" dir="2700000" algn="tl">
+                  <a:srgbClr val="000000">
+                    <a:alpha val="43137"/>
+                  </a:srgbClr>
+                </a:outerShdw>
+              </a:effectLst>
+            </a:endParaRPr>
           </a:p>
         </p:txBody>
       </p:sp>
@@ -4482,8 +4859,20 @@
             <a:avLst/>
           </a:prstGeom>
           <a:ln w="44450">
+            <a:solidFill>
+              <a:schemeClr val="bg1">
+                <a:lumMod val="95000"/>
+              </a:schemeClr>
+            </a:solidFill>
             <a:tailEnd type="stealth" w="lg" len="lg"/>
           </a:ln>
+          <a:effectLst>
+            <a:outerShdw blurRad="50800" dist="38100" dir="2700000" algn="tl" rotWithShape="0">
+              <a:prstClr val="black">
+                <a:alpha val="40000"/>
+              </a:prstClr>
+            </a:outerShdw>
+          </a:effectLst>
         </p:spPr>
         <p:style>
           <a:lnRef idx="1">
@@ -4515,8 +4904,20 @@
             <a:avLst/>
           </a:prstGeom>
           <a:ln w="44450">
+            <a:solidFill>
+              <a:schemeClr val="bg1">
+                <a:lumMod val="95000"/>
+              </a:schemeClr>
+            </a:solidFill>
             <a:tailEnd type="stealth" w="lg" len="lg"/>
           </a:ln>
+          <a:effectLst>
+            <a:outerShdw blurRad="50800" dist="38100" dir="2700000" algn="tl" rotWithShape="0">
+              <a:prstClr val="black">
+                <a:alpha val="40000"/>
+              </a:prstClr>
+            </a:outerShdw>
+          </a:effectLst>
         </p:spPr>
         <p:style>
           <a:lnRef idx="1">
@@ -4570,10 +4971,32 @@
             <a:lstStyle/>
             <a:p>
               <a:r>
-                <a:rPr kumimoji="1" lang="en-US" altLang="ja-JP" sz="1200" dirty="0"/>
+                <a:rPr kumimoji="1" lang="en-US" altLang="ja-JP" sz="1200" dirty="0">
+                  <a:solidFill>
+                    <a:schemeClr val="bg1"/>
+                  </a:solidFill>
+                  <a:effectLst>
+                    <a:outerShdw blurRad="38100" dist="38100" dir="2700000" algn="tl">
+                      <a:srgbClr val="000000">
+                        <a:alpha val="43137"/>
+                      </a:srgbClr>
+                    </a:outerShdw>
+                  </a:effectLst>
+                </a:rPr>
                 <a:t>Toggle by                     +                     + </a:t>
               </a:r>
-              <a:endParaRPr kumimoji="1" lang="ja-JP" altLang="en-US" sz="1200" dirty="0"/>
+              <a:endParaRPr kumimoji="1" lang="ja-JP" altLang="en-US" sz="1200" dirty="0">
+                <a:solidFill>
+                  <a:schemeClr val="bg1"/>
+                </a:solidFill>
+                <a:effectLst>
+                  <a:outerShdw blurRad="38100" dist="38100" dir="2700000" algn="tl">
+                    <a:srgbClr val="000000">
+                      <a:alpha val="43137"/>
+                    </a:srgbClr>
+                  </a:outerShdw>
+                </a:effectLst>
+              </a:endParaRPr>
             </a:p>
           </p:txBody>
         </p:sp>
@@ -4591,7 +5014,9 @@
             <a:prstGeom prst="roundRect">
               <a:avLst/>
             </a:prstGeom>
-            <a:noFill/>
+            <a:solidFill>
+              <a:schemeClr val="bg1"/>
+            </a:solidFill>
             <a:ln w="28575">
               <a:solidFill>
                 <a:schemeClr val="tx1"/>
@@ -4626,7 +5051,9 @@
             <a:prstGeom prst="roundRect">
               <a:avLst/>
             </a:prstGeom>
-            <a:noFill/>
+            <a:solidFill>
+              <a:schemeClr val="bg1"/>
+            </a:solidFill>
             <a:ln w="28575">
               <a:solidFill>
                 <a:schemeClr val="tx1"/>
@@ -4661,7 +5088,9 @@
             <a:prstGeom prst="roundRect">
               <a:avLst/>
             </a:prstGeom>
-            <a:noFill/>
+            <a:solidFill>
+              <a:schemeClr val="bg1"/>
+            </a:solidFill>
             <a:ln w="28575">
               <a:solidFill>
                 <a:schemeClr val="tx1"/>
@@ -4683,6 +5112,84 @@
           </p:txBody>
         </p:sp>
       </p:grpSp>
+      <p:sp>
+        <p:nvSpPr>
+          <p:cNvPr id="61" name="Rectangle: Rounded Corners 60">
+            <a:extLst>
+              <a:ext uri="{FF2B5EF4-FFF2-40B4-BE49-F238E27FC236}">
+                <a16:creationId xmlns:a16="http://schemas.microsoft.com/office/drawing/2014/main" id="{B84D72CA-C49F-4B6C-BA18-7C6D74682E7E}"/>
+              </a:ext>
+            </a:extLst>
+          </p:cNvPr>
+          <p:cNvSpPr/>
+          <p:nvPr/>
+        </p:nvSpPr>
+        <p:spPr>
+          <a:xfrm>
+            <a:off x="6938513" y="3753383"/>
+            <a:ext cx="352875" cy="86762"/>
+          </a:xfrm>
+          <a:prstGeom prst="roundRect">
+            <a:avLst>
+              <a:gd name="adj" fmla="val 8324"/>
+            </a:avLst>
+          </a:prstGeom>
+          <a:solidFill>
+            <a:schemeClr val="bg1"/>
+          </a:solidFill>
+          <a:ln>
+            <a:noFill/>
+          </a:ln>
+        </p:spPr>
+        <p:style>
+          <a:lnRef idx="2">
+            <a:schemeClr val="accent1">
+              <a:shade val="50000"/>
+            </a:schemeClr>
+          </a:lnRef>
+          <a:fillRef idx="1">
+            <a:schemeClr val="accent1"/>
+          </a:fillRef>
+          <a:effectRef idx="0">
+            <a:schemeClr val="accent1"/>
+          </a:effectRef>
+          <a:fontRef idx="minor">
+            <a:schemeClr val="lt1"/>
+          </a:fontRef>
+        </p:style>
+        <p:txBody>
+          <a:bodyPr rtlCol="0" anchor="ctr"/>
+          <a:lstStyle/>
+          <a:p>
+            <a:pPr algn="ctr"/>
+            <a:endParaRPr lang="en-US"/>
+          </a:p>
+        </p:txBody>
+      </p:sp>
+      <p:pic>
+        <p:nvPicPr>
+          <p:cNvPr id="4" name="Picture 3"/>
+          <p:cNvPicPr>
+            <a:picLocks noChangeAspect="1"/>
+          </p:cNvPicPr>
+          <p:nvPr/>
+        </p:nvPicPr>
+        <p:blipFill>
+          <a:blip r:embed="rId2"/>
+          <a:stretch>
+            <a:fillRect/>
+          </a:stretch>
+        </p:blipFill>
+        <p:spPr>
+          <a:xfrm flipH="1">
+            <a:off x="6527387" y="2933361"/>
+            <a:ext cx="1119147" cy="1119147"/>
+          </a:xfrm>
+          <a:prstGeom prst="rect">
+            <a:avLst/>
+          </a:prstGeom>
+        </p:spPr>
+      </p:pic>
     </p:spTree>
     <p:extLst>
       <p:ext uri="{BB962C8B-B14F-4D97-AF65-F5344CB8AC3E}">
@@ -4734,10 +5241,7 @@
             <a:avLst/>
           </a:prstGeom>
           <a:solidFill>
-            <a:schemeClr val="tx1">
-              <a:lumMod val="65000"/>
-              <a:lumOff val="35000"/>
-            </a:schemeClr>
+            <a:srgbClr val="018FEC"/>
           </a:solidFill>
           <a:ln>
             <a:noFill/>
@@ -4770,10 +5274,10 @@
       </p:sp>
       <p:sp>
         <p:nvSpPr>
-          <p:cNvPr id="3" name="Rectangle 2">
+          <p:cNvPr id="18" name="Freeform: Shape 17">
             <a:extLst>
               <a:ext uri="{FF2B5EF4-FFF2-40B4-BE49-F238E27FC236}">
-                <a16:creationId xmlns:a16="http://schemas.microsoft.com/office/drawing/2014/main" id="{310B5F98-48C1-4F68-9315-B547407452B0}"/>
+                <a16:creationId xmlns:a16="http://schemas.microsoft.com/office/drawing/2014/main" id="{F4F108C3-4699-4CC9-B99F-6B9E7E93640D}"/>
               </a:ext>
             </a:extLst>
           </p:cNvPr>
@@ -4781,18 +5285,157 @@
           <p:nvPr/>
         </p:nvSpPr>
         <p:spPr>
-          <a:xfrm>
-            <a:off x="3054409" y="3203389"/>
-            <a:ext cx="1219072" cy="168600"/>
+          <a:xfrm rot="5400000">
+            <a:off x="3690954" y="2628615"/>
+            <a:ext cx="510119" cy="466507"/>
           </a:xfrm>
-          <a:prstGeom prst="rect">
+          <a:custGeom>
             <a:avLst/>
-          </a:prstGeom>
+            <a:gdLst>
+              <a:gd name="connsiteX0" fmla="*/ 275727 w 510119"/>
+              <a:gd name="connsiteY0" fmla="*/ 255060 h 510119"/>
+              <a:gd name="connsiteX1" fmla="*/ 275727 w 510119"/>
+              <a:gd name="connsiteY1" fmla="*/ 0 h 510119"/>
+              <a:gd name="connsiteX2" fmla="*/ 510119 w 510119"/>
+              <a:gd name="connsiteY2" fmla="*/ 0 h 510119"/>
+              <a:gd name="connsiteX3" fmla="*/ 459107 w 510119"/>
+              <a:gd name="connsiteY3" fmla="*/ 255060 h 510119"/>
+              <a:gd name="connsiteX4" fmla="*/ 275727 w 510119"/>
+              <a:gd name="connsiteY4" fmla="*/ 510119 h 510119"/>
+              <a:gd name="connsiteX5" fmla="*/ 275727 w 510119"/>
+              <a:gd name="connsiteY5" fmla="*/ 300779 h 510119"/>
+              <a:gd name="connsiteX6" fmla="*/ 449963 w 510119"/>
+              <a:gd name="connsiteY6" fmla="*/ 300779 h 510119"/>
+              <a:gd name="connsiteX7" fmla="*/ 408095 w 510119"/>
+              <a:gd name="connsiteY7" fmla="*/ 510119 h 510119"/>
+              <a:gd name="connsiteX8" fmla="*/ 60156 w 510119"/>
+              <a:gd name="connsiteY8" fmla="*/ 300779 h 510119"/>
+              <a:gd name="connsiteX9" fmla="*/ 230008 w 510119"/>
+              <a:gd name="connsiteY9" fmla="*/ 300779 h 510119"/>
+              <a:gd name="connsiteX10" fmla="*/ 230008 w 510119"/>
+              <a:gd name="connsiteY10" fmla="*/ 510119 h 510119"/>
+              <a:gd name="connsiteX11" fmla="*/ 102024 w 510119"/>
+              <a:gd name="connsiteY11" fmla="*/ 510119 h 510119"/>
+              <a:gd name="connsiteX12" fmla="*/ 0 w 510119"/>
+              <a:gd name="connsiteY12" fmla="*/ 0 h 510119"/>
+              <a:gd name="connsiteX13" fmla="*/ 230008 w 510119"/>
+              <a:gd name="connsiteY13" fmla="*/ 0 h 510119"/>
+              <a:gd name="connsiteX14" fmla="*/ 230008 w 510119"/>
+              <a:gd name="connsiteY14" fmla="*/ 255060 h 510119"/>
+              <a:gd name="connsiteX15" fmla="*/ 51012 w 510119"/>
+              <a:gd name="connsiteY15" fmla="*/ 255060 h 510119"/>
+            </a:gdLst>
+            <a:ahLst/>
+            <a:cxnLst>
+              <a:cxn ang="0">
+                <a:pos x="connsiteX0" y="connsiteY0"/>
+              </a:cxn>
+              <a:cxn ang="0">
+                <a:pos x="connsiteX1" y="connsiteY1"/>
+              </a:cxn>
+              <a:cxn ang="0">
+                <a:pos x="connsiteX2" y="connsiteY2"/>
+              </a:cxn>
+              <a:cxn ang="0">
+                <a:pos x="connsiteX3" y="connsiteY3"/>
+              </a:cxn>
+              <a:cxn ang="0">
+                <a:pos x="connsiteX4" y="connsiteY4"/>
+              </a:cxn>
+              <a:cxn ang="0">
+                <a:pos x="connsiteX5" y="connsiteY5"/>
+              </a:cxn>
+              <a:cxn ang="0">
+                <a:pos x="connsiteX6" y="connsiteY6"/>
+              </a:cxn>
+              <a:cxn ang="0">
+                <a:pos x="connsiteX7" y="connsiteY7"/>
+              </a:cxn>
+              <a:cxn ang="0">
+                <a:pos x="connsiteX8" y="connsiteY8"/>
+              </a:cxn>
+              <a:cxn ang="0">
+                <a:pos x="connsiteX9" y="connsiteY9"/>
+              </a:cxn>
+              <a:cxn ang="0">
+                <a:pos x="connsiteX10" y="connsiteY10"/>
+              </a:cxn>
+              <a:cxn ang="0">
+                <a:pos x="connsiteX11" y="connsiteY11"/>
+              </a:cxn>
+              <a:cxn ang="0">
+                <a:pos x="connsiteX12" y="connsiteY12"/>
+              </a:cxn>
+              <a:cxn ang="0">
+                <a:pos x="connsiteX13" y="connsiteY13"/>
+              </a:cxn>
+              <a:cxn ang="0">
+                <a:pos x="connsiteX14" y="connsiteY14"/>
+              </a:cxn>
+              <a:cxn ang="0">
+                <a:pos x="connsiteX15" y="connsiteY15"/>
+              </a:cxn>
+            </a:cxnLst>
+            <a:rect l="l" t="t" r="r" b="b"/>
+            <a:pathLst>
+              <a:path w="510119" h="510119">
+                <a:moveTo>
+                  <a:pt x="275727" y="255060"/>
+                </a:moveTo>
+                <a:lnTo>
+                  <a:pt x="275727" y="0"/>
+                </a:lnTo>
+                <a:lnTo>
+                  <a:pt x="510119" y="0"/>
+                </a:lnTo>
+                <a:lnTo>
+                  <a:pt x="459107" y="255060"/>
+                </a:lnTo>
+                <a:close/>
+                <a:moveTo>
+                  <a:pt x="275727" y="510119"/>
+                </a:moveTo>
+                <a:lnTo>
+                  <a:pt x="275727" y="300779"/>
+                </a:lnTo>
+                <a:lnTo>
+                  <a:pt x="449963" y="300779"/>
+                </a:lnTo>
+                <a:lnTo>
+                  <a:pt x="408095" y="510119"/>
+                </a:lnTo>
+                <a:close/>
+                <a:moveTo>
+                  <a:pt x="60156" y="300779"/>
+                </a:moveTo>
+                <a:lnTo>
+                  <a:pt x="230008" y="300779"/>
+                </a:lnTo>
+                <a:lnTo>
+                  <a:pt x="230008" y="510119"/>
+                </a:lnTo>
+                <a:lnTo>
+                  <a:pt x="102024" y="510119"/>
+                </a:lnTo>
+                <a:close/>
+                <a:moveTo>
+                  <a:pt x="0" y="0"/>
+                </a:moveTo>
+                <a:lnTo>
+                  <a:pt x="230008" y="0"/>
+                </a:lnTo>
+                <a:lnTo>
+                  <a:pt x="230008" y="255060"/>
+                </a:lnTo>
+                <a:lnTo>
+                  <a:pt x="51012" y="255060"/>
+                </a:lnTo>
+                <a:close/>
+              </a:path>
+            </a:pathLst>
+          </a:custGeom>
           <a:solidFill>
-            <a:schemeClr val="tx1">
-              <a:lumMod val="85000"/>
-              <a:lumOff val="15000"/>
-            </a:schemeClr>
+            <a:srgbClr val="22B5F7"/>
           </a:solidFill>
           <a:ln>
             <a:noFill/>
@@ -4815,7 +5458,9 @@
           </a:fontRef>
         </p:style>
         <p:txBody>
-          <a:bodyPr rtlCol="0" anchor="ctr"/>
+          <a:bodyPr wrap="square" rtlCol="0" anchor="ctr">
+            <a:noAutofit/>
+          </a:bodyPr>
           <a:lstStyle/>
           <a:p>
             <a:pPr algn="ctr"/>
@@ -4825,10 +5470,10 @@
       </p:sp>
       <p:sp>
         <p:nvSpPr>
-          <p:cNvPr id="4" name="Rectangle 3">
+          <p:cNvPr id="3" name="Rectangle 2">
             <a:extLst>
               <a:ext uri="{FF2B5EF4-FFF2-40B4-BE49-F238E27FC236}">
-                <a16:creationId xmlns:a16="http://schemas.microsoft.com/office/drawing/2014/main" id="{E61B6920-F74E-450E-A309-158B4681B4A7}"/>
+                <a16:creationId xmlns:a16="http://schemas.microsoft.com/office/drawing/2014/main" id="{310B5F98-48C1-4F68-9315-B547407452B0}"/>
               </a:ext>
             </a:extLst>
           </p:cNvPr>
@@ -4837,177 +5482,16 @@
         </p:nvSpPr>
         <p:spPr>
           <a:xfrm>
-            <a:off x="3696912" y="2581275"/>
-            <a:ext cx="222522" cy="222522"/>
+            <a:off x="3054409" y="3203389"/>
+            <a:ext cx="1219072" cy="168600"/>
           </a:xfrm>
           <a:prstGeom prst="rect">
             <a:avLst/>
           </a:prstGeom>
           <a:solidFill>
-            <a:schemeClr val="bg1">
-              <a:lumMod val="65000"/>
-            </a:schemeClr>
-          </a:solidFill>
-          <a:ln>
-            <a:noFill/>
-          </a:ln>
-        </p:spPr>
-        <p:style>
-          <a:lnRef idx="2">
-            <a:schemeClr val="accent1">
-              <a:shade val="50000"/>
-            </a:schemeClr>
-          </a:lnRef>
-          <a:fillRef idx="1">
-            <a:schemeClr val="accent1"/>
-          </a:fillRef>
-          <a:effectRef idx="0">
-            <a:schemeClr val="accent1"/>
-          </a:effectRef>
-          <a:fontRef idx="minor">
-            <a:schemeClr val="lt1"/>
-          </a:fontRef>
-        </p:style>
-        <p:txBody>
-          <a:bodyPr rtlCol="0" anchor="ctr"/>
-          <a:lstStyle/>
-          <a:p>
-            <a:pPr algn="ctr"/>
-            <a:endParaRPr lang="en-US"/>
-          </a:p>
-        </p:txBody>
-      </p:sp>
-      <p:sp>
-        <p:nvSpPr>
-          <p:cNvPr id="5" name="Rectangle 4">
-            <a:extLst>
-              <a:ext uri="{FF2B5EF4-FFF2-40B4-BE49-F238E27FC236}">
-                <a16:creationId xmlns:a16="http://schemas.microsoft.com/office/drawing/2014/main" id="{93455AF0-4109-49D4-81F7-0E0B8D270D3B}"/>
-              </a:ext>
-            </a:extLst>
-          </p:cNvPr>
-          <p:cNvSpPr/>
-          <p:nvPr/>
-        </p:nvSpPr>
-        <p:spPr>
-          <a:xfrm>
-            <a:off x="3975837" y="2581275"/>
-            <a:ext cx="222522" cy="222522"/>
-          </a:xfrm>
-          <a:prstGeom prst="rect">
-            <a:avLst/>
-          </a:prstGeom>
-          <a:solidFill>
-            <a:schemeClr val="bg1">
-              <a:lumMod val="65000"/>
-            </a:schemeClr>
-          </a:solidFill>
-          <a:ln>
-            <a:noFill/>
-          </a:ln>
-        </p:spPr>
-        <p:style>
-          <a:lnRef idx="2">
-            <a:schemeClr val="accent1">
-              <a:shade val="50000"/>
-            </a:schemeClr>
-          </a:lnRef>
-          <a:fillRef idx="1">
-            <a:schemeClr val="accent1"/>
-          </a:fillRef>
-          <a:effectRef idx="0">
-            <a:schemeClr val="accent1"/>
-          </a:effectRef>
-          <a:fontRef idx="minor">
-            <a:schemeClr val="lt1"/>
-          </a:fontRef>
-        </p:style>
-        <p:txBody>
-          <a:bodyPr rtlCol="0" anchor="ctr"/>
-          <a:lstStyle/>
-          <a:p>
-            <a:pPr algn="ctr"/>
-            <a:endParaRPr lang="en-US"/>
-          </a:p>
-        </p:txBody>
-      </p:sp>
-      <p:sp>
-        <p:nvSpPr>
-          <p:cNvPr id="6" name="Rectangle 5">
-            <a:extLst>
-              <a:ext uri="{FF2B5EF4-FFF2-40B4-BE49-F238E27FC236}">
-                <a16:creationId xmlns:a16="http://schemas.microsoft.com/office/drawing/2014/main" id="{3E4C24EA-4B37-4DCC-A539-8C49E64CE735}"/>
-              </a:ext>
-            </a:extLst>
-          </p:cNvPr>
-          <p:cNvSpPr/>
-          <p:nvPr/>
-        </p:nvSpPr>
-        <p:spPr>
-          <a:xfrm>
-            <a:off x="3696912" y="2853311"/>
-            <a:ext cx="222522" cy="222522"/>
-          </a:xfrm>
-          <a:prstGeom prst="rect">
-            <a:avLst/>
-          </a:prstGeom>
-          <a:solidFill>
-            <a:schemeClr val="bg1">
-              <a:lumMod val="65000"/>
-            </a:schemeClr>
-          </a:solidFill>
-          <a:ln>
-            <a:noFill/>
-          </a:ln>
-        </p:spPr>
-        <p:style>
-          <a:lnRef idx="2">
-            <a:schemeClr val="accent1">
-              <a:shade val="50000"/>
-            </a:schemeClr>
-          </a:lnRef>
-          <a:fillRef idx="1">
-            <a:schemeClr val="accent1"/>
-          </a:fillRef>
-          <a:effectRef idx="0">
-            <a:schemeClr val="accent1"/>
-          </a:effectRef>
-          <a:fontRef idx="minor">
-            <a:schemeClr val="lt1"/>
-          </a:fontRef>
-        </p:style>
-        <p:txBody>
-          <a:bodyPr rtlCol="0" anchor="ctr"/>
-          <a:lstStyle/>
-          <a:p>
-            <a:pPr algn="ctr"/>
-            <a:endParaRPr lang="en-US"/>
-          </a:p>
-        </p:txBody>
-      </p:sp>
-      <p:sp>
-        <p:nvSpPr>
-          <p:cNvPr id="7" name="Rectangle 6">
-            <a:extLst>
-              <a:ext uri="{FF2B5EF4-FFF2-40B4-BE49-F238E27FC236}">
-                <a16:creationId xmlns:a16="http://schemas.microsoft.com/office/drawing/2014/main" id="{D37D4010-634C-4CBD-ADA5-03952EB49659}"/>
-              </a:ext>
-            </a:extLst>
-          </p:cNvPr>
-          <p:cNvSpPr/>
-          <p:nvPr/>
-        </p:nvSpPr>
-        <p:spPr>
-          <a:xfrm>
-            <a:off x="3975837" y="2853311"/>
-            <a:ext cx="222522" cy="222522"/>
-          </a:xfrm>
-          <a:prstGeom prst="rect">
-            <a:avLst/>
-          </a:prstGeom>
-          <a:solidFill>
-            <a:schemeClr val="bg1">
-              <a:lumMod val="65000"/>
+            <a:schemeClr val="tx1">
+              <a:lumMod val="85000"/>
+              <a:lumOff val="15000"/>
             </a:schemeClr>
           </a:solidFill>
           <a:ln>

</xml_diff>